<commit_message>
Revert "Kbh -> main merge"
</commit_message>
<xml_diff>
--- a/LePl_Server.pptx
+++ b/LePl_Server.pptx
@@ -279,7 +279,7 @@
           <a:p>
             <a:fld id="{54483ECF-B484-47BC-8A21-BE400A6D37B2}" type="datetimeFigureOut">
               <a:rPr lang="ko-KR" altLang="en-US" smtClean="0"/>
-              <a:t>2023-05-04</a:t>
+              <a:t>2023-04-27</a:t>
             </a:fld>
             <a:endParaRPr lang="ko-KR" altLang="en-US"/>
           </a:p>
@@ -477,7 +477,7 @@
           <a:p>
             <a:fld id="{54483ECF-B484-47BC-8A21-BE400A6D37B2}" type="datetimeFigureOut">
               <a:rPr lang="ko-KR" altLang="en-US" smtClean="0"/>
-              <a:t>2023-05-04</a:t>
+              <a:t>2023-04-27</a:t>
             </a:fld>
             <a:endParaRPr lang="ko-KR" altLang="en-US"/>
           </a:p>
@@ -685,7 +685,7 @@
           <a:p>
             <a:fld id="{54483ECF-B484-47BC-8A21-BE400A6D37B2}" type="datetimeFigureOut">
               <a:rPr lang="ko-KR" altLang="en-US" smtClean="0"/>
-              <a:t>2023-05-04</a:t>
+              <a:t>2023-04-27</a:t>
             </a:fld>
             <a:endParaRPr lang="ko-KR" altLang="en-US"/>
           </a:p>
@@ -883,7 +883,7 @@
           <a:p>
             <a:fld id="{54483ECF-B484-47BC-8A21-BE400A6D37B2}" type="datetimeFigureOut">
               <a:rPr lang="ko-KR" altLang="en-US" smtClean="0"/>
-              <a:t>2023-05-04</a:t>
+              <a:t>2023-04-27</a:t>
             </a:fld>
             <a:endParaRPr lang="ko-KR" altLang="en-US"/>
           </a:p>
@@ -1158,7 +1158,7 @@
           <a:p>
             <a:fld id="{54483ECF-B484-47BC-8A21-BE400A6D37B2}" type="datetimeFigureOut">
               <a:rPr lang="ko-KR" altLang="en-US" smtClean="0"/>
-              <a:t>2023-05-04</a:t>
+              <a:t>2023-04-27</a:t>
             </a:fld>
             <a:endParaRPr lang="ko-KR" altLang="en-US"/>
           </a:p>
@@ -1423,7 +1423,7 @@
           <a:p>
             <a:fld id="{54483ECF-B484-47BC-8A21-BE400A6D37B2}" type="datetimeFigureOut">
               <a:rPr lang="ko-KR" altLang="en-US" smtClean="0"/>
-              <a:t>2023-05-04</a:t>
+              <a:t>2023-04-27</a:t>
             </a:fld>
             <a:endParaRPr lang="ko-KR" altLang="en-US"/>
           </a:p>
@@ -1835,7 +1835,7 @@
           <a:p>
             <a:fld id="{54483ECF-B484-47BC-8A21-BE400A6D37B2}" type="datetimeFigureOut">
               <a:rPr lang="ko-KR" altLang="en-US" smtClean="0"/>
-              <a:t>2023-05-04</a:t>
+              <a:t>2023-04-27</a:t>
             </a:fld>
             <a:endParaRPr lang="ko-KR" altLang="en-US"/>
           </a:p>
@@ -1976,7 +1976,7 @@
           <a:p>
             <a:fld id="{54483ECF-B484-47BC-8A21-BE400A6D37B2}" type="datetimeFigureOut">
               <a:rPr lang="ko-KR" altLang="en-US" smtClean="0"/>
-              <a:t>2023-05-04</a:t>
+              <a:t>2023-04-27</a:t>
             </a:fld>
             <a:endParaRPr lang="ko-KR" altLang="en-US"/>
           </a:p>
@@ -2089,7 +2089,7 @@
           <a:p>
             <a:fld id="{54483ECF-B484-47BC-8A21-BE400A6D37B2}" type="datetimeFigureOut">
               <a:rPr lang="ko-KR" altLang="en-US" smtClean="0"/>
-              <a:t>2023-05-04</a:t>
+              <a:t>2023-04-27</a:t>
             </a:fld>
             <a:endParaRPr lang="ko-KR" altLang="en-US"/>
           </a:p>
@@ -2400,7 +2400,7 @@
           <a:p>
             <a:fld id="{54483ECF-B484-47BC-8A21-BE400A6D37B2}" type="datetimeFigureOut">
               <a:rPr lang="ko-KR" altLang="en-US" smtClean="0"/>
-              <a:t>2023-05-04</a:t>
+              <a:t>2023-04-27</a:t>
             </a:fld>
             <a:endParaRPr lang="ko-KR" altLang="en-US"/>
           </a:p>
@@ -2688,7 +2688,7 @@
           <a:p>
             <a:fld id="{54483ECF-B484-47BC-8A21-BE400A6D37B2}" type="datetimeFigureOut">
               <a:rPr lang="ko-KR" altLang="en-US" smtClean="0"/>
-              <a:t>2023-05-04</a:t>
+              <a:t>2023-04-27</a:t>
             </a:fld>
             <a:endParaRPr lang="ko-KR" altLang="en-US"/>
           </a:p>
@@ -2929,7 +2929,7 @@
           <a:p>
             <a:fld id="{54483ECF-B484-47BC-8A21-BE400A6D37B2}" type="datetimeFigureOut">
               <a:rPr lang="ko-KR" altLang="en-US" smtClean="0"/>
-              <a:t>2023-05-04</a:t>
+              <a:t>2023-04-27</a:t>
             </a:fld>
             <a:endParaRPr lang="ko-KR" altLang="en-US"/>
           </a:p>
@@ -3668,10 +3668,10 @@
       </p:sp>
       <p:pic>
         <p:nvPicPr>
-          <p:cNvPr id="6" name="그림 5">
-            <a:extLst>
-              <a:ext uri="{FF2B5EF4-FFF2-40B4-BE49-F238E27FC236}">
-                <a16:creationId xmlns:a16="http://schemas.microsoft.com/office/drawing/2014/main" id="{148CB41A-E5DD-E67F-4CD5-7C233A4661C9}"/>
+          <p:cNvPr id="5" name="그림 4">
+            <a:extLst>
+              <a:ext uri="{FF2B5EF4-FFF2-40B4-BE49-F238E27FC236}">
+                <a16:creationId xmlns:a16="http://schemas.microsoft.com/office/drawing/2014/main" id="{10EC67D9-F12A-31BC-DC3E-6230364366CE}"/>
               </a:ext>
             </a:extLst>
           </p:cNvPr>
@@ -3688,8 +3688,8 @@
         </p:blipFill>
         <p:spPr>
           <a:xfrm>
-            <a:off x="279919" y="1062449"/>
-            <a:ext cx="11632162" cy="4829065"/>
+            <a:off x="492868" y="942097"/>
+            <a:ext cx="11206263" cy="5151282"/>
           </a:xfrm>
           <a:prstGeom prst="rect">
             <a:avLst/>
@@ -21217,7 +21217,7 @@
         </p:nvSpPr>
         <p:spPr>
           <a:xfrm>
-            <a:off x="3404633" y="2894832"/>
+            <a:off x="4273571" y="1876647"/>
             <a:ext cx="1617617" cy="369332"/>
           </a:xfrm>
           <a:prstGeom prst="rect">
@@ -23991,7 +23991,7 @@
                   <a:schemeClr val="tx1"/>
                 </a:solidFill>
               </a:rPr>
-              <a:t>Coin</a:t>
+              <a:t>COIN</a:t>
             </a:r>
             <a:endParaRPr lang="en-US" altLang="ko-KR" sz="1300" b="1" dirty="0">
               <a:solidFill>
@@ -24013,7 +24013,17 @@
                   <a:schemeClr val="tx1"/>
                 </a:solidFill>
               </a:rPr>
-              <a:t>id : Long</a:t>
+              <a:t>Id : Long</a:t>
+            </a:r>
+          </a:p>
+          <a:p>
+            <a:r>
+              <a:rPr lang="en-US" altLang="ko-KR" sz="1300" b="1" dirty="0">
+                <a:solidFill>
+                  <a:schemeClr val="tx1"/>
+                </a:solidFill>
+              </a:rPr>
+              <a:t>character : CHARACTIER</a:t>
             </a:r>
             <a:endParaRPr lang="ko-KR" altLang="en-US" sz="1300" b="1" dirty="0">
               <a:solidFill>
@@ -24028,7 +24038,7 @@
                   <a:schemeClr val="tx1"/>
                 </a:solidFill>
               </a:rPr>
-              <a:t>coinAll</a:t>
+              <a:t>coin_all</a:t>
             </a:r>
             <a:r>
               <a:rPr lang="en-US" altLang="ko-KR" sz="1300" dirty="0">
@@ -24157,7 +24167,7 @@
                   <a:schemeClr val="tx1"/>
                 </a:solidFill>
               </a:rPr>
-              <a:t>Exp</a:t>
+              <a:t>EXP</a:t>
             </a:r>
             <a:endParaRPr lang="en-US" altLang="ko-KR" sz="1300" b="1" dirty="0">
               <a:solidFill>
@@ -24179,8 +24189,23 @@
                   <a:schemeClr val="tx1"/>
                 </a:solidFill>
               </a:rPr>
-              <a:t>id : Long</a:t>
-            </a:r>
+              <a:t>Id : Long</a:t>
+            </a:r>
+          </a:p>
+          <a:p>
+            <a:r>
+              <a:rPr lang="en-US" altLang="ko-KR" sz="1300" b="1" dirty="0">
+                <a:solidFill>
+                  <a:schemeClr val="tx1"/>
+                </a:solidFill>
+              </a:rPr>
+              <a:t>character : CHARACTIER</a:t>
+            </a:r>
+            <a:endParaRPr lang="ko-KR" altLang="en-US" sz="1300" b="1" dirty="0">
+              <a:solidFill>
+                <a:schemeClr val="tx1"/>
+              </a:solidFill>
+            </a:endParaRPr>
           </a:p>
           <a:p>
             <a:r>
@@ -24189,7 +24214,7 @@
                   <a:schemeClr val="tx1"/>
                 </a:solidFill>
               </a:rPr>
-              <a:t>expAll</a:t>
+              <a:t>exp_all</a:t>
             </a:r>
             <a:r>
               <a:rPr lang="en-US" altLang="ko-KR" sz="1300" dirty="0">
@@ -24275,12 +24300,12 @@
           <a:lstStyle/>
           <a:p>
             <a:r>
-              <a:rPr lang="en-US" altLang="ko-KR" sz="1400" b="1" dirty="0" err="1">
+              <a:rPr lang="en-US" altLang="ko-KR" sz="1400" b="1" dirty="0">
                 <a:solidFill>
                   <a:schemeClr val="tx1"/>
                 </a:solidFill>
               </a:rPr>
-              <a:t>CharacterItem</a:t>
+              <a:t>ITEM</a:t>
             </a:r>
             <a:endParaRPr lang="en-US" altLang="ko-KR" sz="1300" b="1" dirty="0">
               <a:solidFill>
@@ -24302,7 +24327,7 @@
                   <a:schemeClr val="tx1"/>
                 </a:solidFill>
               </a:rPr>
-              <a:t>id : Long</a:t>
+              <a:t>Id : Long</a:t>
             </a:r>
           </a:p>
           <a:p>
@@ -24312,7 +24337,7 @@
                   <a:schemeClr val="tx1"/>
                 </a:solidFill>
               </a:rPr>
-              <a:t>character : Character</a:t>
+              <a:t>character : CHARACTIER</a:t>
             </a:r>
             <a:endParaRPr lang="ko-KR" altLang="en-US" sz="1300" b="1" dirty="0">
               <a:solidFill>
@@ -24327,7 +24352,7 @@
                   <a:schemeClr val="tx1"/>
                 </a:solidFill>
               </a:rPr>
-              <a:t>itemId</a:t>
+              <a:t>item_id</a:t>
             </a:r>
             <a:r>
               <a:rPr lang="en-US" altLang="ko-KR" sz="1300" dirty="0">
@@ -24345,7 +24370,7 @@
                   <a:schemeClr val="tx1"/>
                 </a:solidFill>
               </a:rPr>
-              <a:t>wearingStatus</a:t>
+              <a:t>wearing_status</a:t>
             </a:r>
             <a:r>
               <a:rPr lang="en-US" altLang="ko-KR" sz="1300" dirty="0">
@@ -24469,7 +24494,7 @@
                   <a:schemeClr val="tx1"/>
                 </a:solidFill>
               </a:rPr>
-              <a:t>Character</a:t>
+              <a:t>CHARACTER</a:t>
             </a:r>
             <a:endParaRPr lang="en-US" altLang="ko-KR" sz="1300" b="1" dirty="0">
               <a:solidFill>
@@ -24511,7 +24536,7 @@
                   <a:schemeClr val="tx1"/>
                 </a:solidFill>
               </a:rPr>
-              <a:t>coin : Coin</a:t>
+              <a:t>coin : COIN</a:t>
             </a:r>
           </a:p>
           <a:p>
@@ -24521,17 +24546,25 @@
                   <a:schemeClr val="tx1"/>
                 </a:solidFill>
               </a:rPr>
-              <a:t>exp : Exp</a:t>
-            </a:r>
-          </a:p>
-          <a:p>
+              <a:t>exp : EXP</a:t>
+            </a:r>
+          </a:p>
+          <a:p>
+            <a:r>
+              <a:rPr lang="en-US" altLang="ko-KR" sz="1300" b="1" dirty="0">
+                <a:solidFill>
+                  <a:schemeClr val="tx1"/>
+                </a:solidFill>
+              </a:rPr>
+              <a:t>item : </a:t>
+            </a:r>
             <a:r>
               <a:rPr lang="en-US" altLang="ko-KR" sz="1300" b="1" dirty="0" err="1">
                 <a:solidFill>
                   <a:schemeClr val="tx1"/>
                 </a:solidFill>
               </a:rPr>
-              <a:t>characterItems</a:t>
+              <a:t>ArrayList</a:t>
             </a:r>
             <a:r>
               <a:rPr lang="en-US" altLang="ko-KR" sz="1300" b="1" dirty="0">
@@ -24539,23 +24572,7 @@
                   <a:schemeClr val="tx1"/>
                 </a:solidFill>
               </a:rPr>
-              <a:t> : List&lt;</a:t>
-            </a:r>
-            <a:r>
-              <a:rPr lang="en-US" altLang="ko-KR" sz="1300" b="1" dirty="0" err="1">
-                <a:solidFill>
-                  <a:schemeClr val="tx1"/>
-                </a:solidFill>
-              </a:rPr>
-              <a:t>CharacterItem</a:t>
-            </a:r>
-            <a:r>
-              <a:rPr lang="en-US" altLang="ko-KR" sz="1300" b="1" dirty="0">
-                <a:solidFill>
-                  <a:schemeClr val="tx1"/>
-                </a:solidFill>
-              </a:rPr>
-              <a:t>&gt;</a:t>
+              <a:t>&lt;ITEM&gt;</a:t>
             </a:r>
           </a:p>
         </p:txBody>
@@ -24666,13 +24683,18 @@
           <a:lstStyle/>
           <a:p>
             <a:r>
-              <a:rPr lang="en-US" altLang="ko-KR" sz="1300" b="1" dirty="0">
+              <a:rPr lang="en-US" altLang="ko-KR" sz="1400" b="1" dirty="0">
                 <a:solidFill>
                   <a:schemeClr val="tx1"/>
                 </a:solidFill>
               </a:rPr>
-              <a:t>Member</a:t>
-            </a:r>
+              <a:t>MEMBER</a:t>
+            </a:r>
+            <a:endParaRPr lang="en-US" altLang="ko-KR" sz="1300" b="1" dirty="0">
+              <a:solidFill>
+                <a:schemeClr val="tx1"/>
+              </a:solidFill>
+            </a:endParaRPr>
           </a:p>
           <a:p>
             <a:endParaRPr lang="en-US" altLang="ko-KR" sz="1300" dirty="0">
@@ -24693,24 +24715,6 @@
           </a:p>
           <a:p>
             <a:r>
-              <a:rPr lang="en-US" altLang="ko-KR" sz="1300" dirty="0" err="1">
-                <a:solidFill>
-                  <a:schemeClr val="tx1"/>
-                </a:solidFill>
-              </a:rPr>
-              <a:t>uid</a:t>
-            </a:r>
-            <a:r>
-              <a:rPr lang="en-US" altLang="ko-KR" sz="1300" dirty="0">
-                <a:solidFill>
-                  <a:schemeClr val="tx1"/>
-                </a:solidFill>
-              </a:rPr>
-              <a:t>: String</a:t>
-            </a:r>
-          </a:p>
-          <a:p>
-            <a:r>
               <a:rPr lang="en-US" altLang="ko-KR" sz="1300" dirty="0">
                 <a:solidFill>
                   <a:schemeClr val="tx1"/>
@@ -24726,7 +24730,7 @@
                   <a:schemeClr val="tx1"/>
                 </a:solidFill>
               </a:rPr>
-              <a:t>lists : List&lt;Lists&gt;</a:t>
+              <a:t>character : CHARACTER</a:t>
             </a:r>
           </a:p>
           <a:p>
@@ -24736,18 +24740,29 @@
                   <a:schemeClr val="tx1"/>
                 </a:solidFill>
               </a:rPr>
-              <a:t>profile : Profile</a:t>
-            </a:r>
-          </a:p>
-          <a:p>
+              <a:t>lists : </a:t>
+            </a:r>
+            <a:r>
+              <a:rPr lang="en-US" altLang="ko-KR" sz="1300" b="1" dirty="0" err="1">
+                <a:solidFill>
+                  <a:schemeClr val="tx1"/>
+                </a:solidFill>
+              </a:rPr>
+              <a:t>ArrayList</a:t>
+            </a:r>
             <a:r>
               <a:rPr lang="en-US" altLang="ko-KR" sz="1300" b="1" dirty="0">
                 <a:solidFill>
                   <a:schemeClr val="tx1"/>
                 </a:solidFill>
               </a:rPr>
-              <a:t>character : CHARACTER</a:t>
-            </a:r>
+              <a:t>&lt;LISTS&gt;</a:t>
+            </a:r>
+            <a:endParaRPr lang="ko-KR" altLang="en-US" sz="1300" b="1" dirty="0">
+              <a:solidFill>
+                <a:schemeClr val="tx1"/>
+              </a:solidFill>
+            </a:endParaRPr>
           </a:p>
         </p:txBody>
       </p:sp>
@@ -24862,7 +24877,7 @@
                   <a:schemeClr val="tx1"/>
                 </a:solidFill>
               </a:rPr>
-              <a:t>Profile</a:t>
+              <a:t>PROFILE</a:t>
             </a:r>
             <a:endParaRPr lang="en-US" altLang="ko-KR" sz="1300" b="1" dirty="0">
               <a:solidFill>
@@ -24886,18 +24901,16 @@
               </a:rPr>
               <a:t>id : Long</a:t>
             </a:r>
-            <a:endParaRPr lang="en-US" altLang="ko-KR" sz="1300" b="1" dirty="0">
-              <a:solidFill>
-                <a:schemeClr val="tx1"/>
-              </a:solidFill>
-            </a:endParaRPr>
-          </a:p>
-          <a:p>
-            <a:endParaRPr lang="en-US" altLang="ko-KR" sz="1300" dirty="0">
-              <a:solidFill>
-                <a:schemeClr val="tx1"/>
-              </a:solidFill>
-            </a:endParaRPr>
+          </a:p>
+          <a:p>
+            <a:r>
+              <a:rPr lang="en-US" altLang="ko-KR" sz="1300" b="1" dirty="0">
+                <a:solidFill>
+                  <a:schemeClr val="tx1"/>
+                </a:solidFill>
+              </a:rPr>
+              <a:t>member : MEMBER</a:t>
+            </a:r>
           </a:p>
         </p:txBody>
       </p:sp>
@@ -25012,7 +25025,7 @@
                   <a:schemeClr val="tx1"/>
                 </a:solidFill>
               </a:rPr>
-              <a:t>Lists</a:t>
+              <a:t>LISTS</a:t>
             </a:r>
             <a:endParaRPr lang="en-US" altLang="ko-KR" sz="1300" b="1" dirty="0">
               <a:solidFill>
@@ -25044,7 +25057,7 @@
                   <a:schemeClr val="tx1"/>
                 </a:solidFill>
               </a:rPr>
-              <a:t>member : Member</a:t>
+              <a:t>member : MEMBER</a:t>
             </a:r>
           </a:p>
           <a:p>
@@ -25054,7 +25067,7 @@
                   <a:schemeClr val="tx1"/>
                 </a:solidFill>
               </a:rPr>
-              <a:t>listsDate</a:t>
+              <a:t>lists_date</a:t>
             </a:r>
             <a:r>
               <a:rPr lang="en-US" altLang="ko-KR" sz="1300" dirty="0">
@@ -25062,21 +25075,8 @@
                   <a:schemeClr val="tx1"/>
                 </a:solidFill>
               </a:rPr>
-              <a:t> : </a:t>
-            </a:r>
-            <a:r>
-              <a:rPr lang="en-US" altLang="ko-KR" sz="1300" dirty="0" err="1">
-                <a:solidFill>
-                  <a:schemeClr val="tx1"/>
-                </a:solidFill>
-              </a:rPr>
-              <a:t>LocalDateTime</a:t>
-            </a:r>
-            <a:endParaRPr lang="en-US" altLang="ko-KR" sz="1300" dirty="0">
-              <a:solidFill>
-                <a:schemeClr val="tx1"/>
-              </a:solidFill>
-            </a:endParaRPr>
+              <a:t> : Date</a:t>
+            </a:r>
           </a:p>
           <a:p>
             <a:r>
@@ -25085,7 +25085,7 @@
                   <a:schemeClr val="tx1"/>
                 </a:solidFill>
               </a:rPr>
-              <a:t>listsTasks</a:t>
+              <a:t>lists_task</a:t>
             </a:r>
             <a:r>
               <a:rPr lang="en-US" altLang="ko-KR" sz="1300" b="1" dirty="0">
@@ -25093,7 +25093,7 @@
                   <a:schemeClr val="tx1"/>
                 </a:solidFill>
               </a:rPr>
-              <a:t> : List&lt;</a:t>
+              <a:t> : </a:t>
             </a:r>
             <a:r>
               <a:rPr lang="en-US" altLang="ko-KR" sz="1300" b="1" dirty="0" err="1">
@@ -25101,7 +25101,7 @@
                   <a:schemeClr val="tx1"/>
                 </a:solidFill>
               </a:rPr>
-              <a:t>ListsTask</a:t>
+              <a:t>ArrayList</a:t>
             </a:r>
             <a:r>
               <a:rPr lang="en-US" altLang="ko-KR" sz="1300" b="1" dirty="0">
@@ -25109,7 +25109,7 @@
                   <a:schemeClr val="tx1"/>
                 </a:solidFill>
               </a:rPr>
-              <a:t>&gt;</a:t>
+              <a:t>&lt;LISTS_TASK&gt;</a:t>
             </a:r>
             <a:endParaRPr lang="ko-KR" altLang="en-US" sz="1300" b="1" dirty="0">
               <a:solidFill>
@@ -25230,7 +25230,7 @@
                   <a:schemeClr val="tx1"/>
                 </a:solidFill>
               </a:rPr>
-              <a:t>Task</a:t>
+              <a:t>TASK</a:t>
             </a:r>
             <a:endParaRPr lang="en-US" altLang="ko-KR" sz="1300" b="1" dirty="0">
               <a:solidFill>
@@ -25267,65 +25267,23 @@
           </a:p>
           <a:p>
             <a:r>
-              <a:rPr lang="en-US" altLang="ko-KR" sz="1300" dirty="0" err="1">
-                <a:solidFill>
-                  <a:schemeClr val="tx1"/>
-                </a:solidFill>
-              </a:rPr>
-              <a:t>startTime</a:t>
-            </a:r>
-            <a:r>
               <a:rPr lang="en-US" altLang="ko-KR" sz="1300" dirty="0">
                 <a:solidFill>
                   <a:schemeClr val="tx1"/>
                 </a:solidFill>
               </a:rPr>
-              <a:t> : </a:t>
-            </a:r>
-            <a:r>
-              <a:rPr lang="en-US" altLang="ko-KR" sz="1300" dirty="0" err="1">
-                <a:solidFill>
-                  <a:schemeClr val="tx1"/>
-                </a:solidFill>
-              </a:rPr>
-              <a:t>LocalDateTime</a:t>
-            </a:r>
-            <a:endParaRPr lang="en-US" altLang="ko-KR" sz="1300" dirty="0">
-              <a:solidFill>
-                <a:schemeClr val="tx1"/>
-              </a:solidFill>
-            </a:endParaRPr>
-          </a:p>
-          <a:p>
-            <a:r>
-              <a:rPr lang="en-US" altLang="ko-KR" sz="1300" dirty="0" err="1">
-                <a:solidFill>
-                  <a:schemeClr val="tx1"/>
-                </a:solidFill>
-              </a:rPr>
-              <a:t>endTime</a:t>
-            </a:r>
+              <a:t>start : Datetime</a:t>
+            </a:r>
+          </a:p>
+          <a:p>
             <a:r>
               <a:rPr lang="en-US" altLang="ko-KR" sz="1300" dirty="0">
                 <a:solidFill>
                   <a:schemeClr val="tx1"/>
                 </a:solidFill>
               </a:rPr>
-              <a:t> : </a:t>
-            </a:r>
-            <a:r>
-              <a:rPr lang="en-US" altLang="ko-KR" sz="1300" dirty="0" err="1">
-                <a:solidFill>
-                  <a:schemeClr val="tx1"/>
-                </a:solidFill>
-              </a:rPr>
-              <a:t>LocalDateTime</a:t>
-            </a:r>
-            <a:endParaRPr lang="en-US" altLang="ko-KR" sz="1300" dirty="0">
-              <a:solidFill>
-                <a:schemeClr val="tx1"/>
-              </a:solidFill>
-            </a:endParaRPr>
+              <a:t>end : Datetime</a:t>
+            </a:r>
           </a:p>
           <a:p>
             <a:r>
@@ -25334,17 +25292,15 @@
                   <a:schemeClr val="tx1"/>
                 </a:solidFill>
               </a:rPr>
-              <a:t>timers : List&lt;Timer&gt;</a:t>
-            </a:r>
-          </a:p>
-          <a:p>
+              <a:t>timer : </a:t>
+            </a:r>
             <a:r>
               <a:rPr lang="en-US" altLang="ko-KR" sz="1300" b="1" dirty="0" err="1">
                 <a:solidFill>
                   <a:schemeClr val="tx1"/>
                 </a:solidFill>
               </a:rPr>
-              <a:t>taskStatus</a:t>
+              <a:t>ArrayList</a:t>
             </a:r>
             <a:r>
               <a:rPr lang="en-US" altLang="ko-KR" sz="1300" b="1" dirty="0">
@@ -25352,21 +25308,26 @@
                   <a:schemeClr val="tx1"/>
                 </a:solidFill>
               </a:rPr>
-              <a:t> : </a:t>
-            </a:r>
+              <a:t>&lt;TIMER&gt;</a:t>
+            </a:r>
+          </a:p>
+          <a:p>
             <a:r>
               <a:rPr lang="en-US" altLang="ko-KR" sz="1300" b="1" dirty="0" err="1">
                 <a:solidFill>
                   <a:schemeClr val="tx1"/>
                 </a:solidFill>
               </a:rPr>
-              <a:t>TaskStatus</a:t>
-            </a:r>
-            <a:endParaRPr lang="en-US" altLang="ko-KR" sz="1300" b="1" dirty="0">
-              <a:solidFill>
-                <a:schemeClr val="tx1"/>
-              </a:solidFill>
-            </a:endParaRPr>
+              <a:t>task_status</a:t>
+            </a:r>
+            <a:r>
+              <a:rPr lang="en-US" altLang="ko-KR" sz="1300" b="1" dirty="0">
+                <a:solidFill>
+                  <a:schemeClr val="tx1"/>
+                </a:solidFill>
+              </a:rPr>
+              <a:t> : TASK_STATUS</a:t>
+            </a:r>
           </a:p>
         </p:txBody>
       </p:sp>
@@ -25386,7 +25347,7 @@
         </p:nvCxnSpPr>
         <p:spPr>
           <a:xfrm>
-            <a:off x="10273622" y="2929889"/>
+            <a:off x="10273622" y="2967459"/>
             <a:ext cx="1810411" cy="0"/>
           </a:xfrm>
           <a:prstGeom prst="line">
@@ -25476,18 +25437,13 @@
           <a:lstStyle/>
           <a:p>
             <a:r>
-              <a:rPr lang="en-US" altLang="ko-KR" sz="1400" b="1" dirty="0" err="1">
+              <a:rPr lang="en-US" altLang="ko-KR" sz="1400" b="1" dirty="0">
                 <a:solidFill>
                   <a:schemeClr val="tx1"/>
                 </a:solidFill>
               </a:rPr>
-              <a:t>TaskStatus</a:t>
-            </a:r>
-            <a:endParaRPr lang="en-US" altLang="ko-KR" sz="1400" b="1" dirty="0">
-              <a:solidFill>
-                <a:schemeClr val="tx1"/>
-              </a:solidFill>
-            </a:endParaRPr>
+              <a:t>TASK_STATUS</a:t>
+            </a:r>
           </a:p>
           <a:p>
             <a:endParaRPr lang="en-US" altLang="ko-KR" sz="1300" dirty="0">
@@ -25508,12 +25464,22 @@
           </a:p>
           <a:p>
             <a:r>
+              <a:rPr lang="en-US" altLang="ko-KR" sz="1300" dirty="0">
+                <a:solidFill>
+                  <a:schemeClr val="tx1"/>
+                </a:solidFill>
+              </a:rPr>
+              <a:t>status : Boolean</a:t>
+            </a:r>
+          </a:p>
+          <a:p>
+            <a:r>
               <a:rPr lang="en-US" altLang="ko-KR" sz="1300" dirty="0" err="1">
                 <a:solidFill>
                   <a:schemeClr val="tx1"/>
                 </a:solidFill>
               </a:rPr>
-              <a:t>completedStatus</a:t>
+              <a:t>timer_onoff</a:t>
             </a:r>
             <a:r>
               <a:rPr lang="en-US" altLang="ko-KR" sz="1300" dirty="0">
@@ -25523,24 +25489,6 @@
               </a:rPr>
               <a:t> : Boolean</a:t>
             </a:r>
-          </a:p>
-          <a:p>
-            <a:r>
-              <a:rPr lang="en-US" altLang="ko-KR" sz="1300" dirty="0" err="1">
-                <a:solidFill>
-                  <a:schemeClr val="tx1"/>
-                </a:solidFill>
-              </a:rPr>
-              <a:t>timerOnOff</a:t>
-            </a:r>
-            <a:r>
-              <a:rPr lang="en-US" altLang="ko-KR" sz="1300" dirty="0">
-                <a:solidFill>
-                  <a:schemeClr val="tx1"/>
-                </a:solidFill>
-              </a:rPr>
-              <a:t> : Boolean</a:t>
-            </a:r>
             <a:endParaRPr lang="ko-KR" altLang="en-US" sz="1300" dirty="0">
               <a:solidFill>
                 <a:schemeClr val="tx1"/>
@@ -25601,8 +25549,8 @@
         </p:nvSpPr>
         <p:spPr>
           <a:xfrm>
-            <a:off x="10270917" y="25655"/>
-            <a:ext cx="1814286" cy="2171840"/>
+            <a:off x="10270917" y="705927"/>
+            <a:ext cx="1814286" cy="1491567"/>
           </a:xfrm>
           <a:prstGeom prst="rect">
             <a:avLst/>
@@ -25660,7 +25608,7 @@
                   <a:schemeClr val="tx1"/>
                 </a:solidFill>
               </a:rPr>
-              <a:t>Timer</a:t>
+              <a:t>TIMER</a:t>
             </a:r>
           </a:p>
           <a:p>
@@ -25687,101 +25635,38 @@
                   <a:schemeClr val="tx1"/>
                 </a:solidFill>
               </a:rPr>
-              <a:t>task : Task</a:t>
-            </a:r>
-          </a:p>
-          <a:p>
-            <a:r>
-              <a:rPr lang="en-US" altLang="ko-KR" sz="1300" dirty="0" err="1">
-                <a:solidFill>
-                  <a:schemeClr val="tx1"/>
-                </a:solidFill>
-              </a:rPr>
-              <a:t>startTime</a:t>
-            </a:r>
+              <a:t>task : TASK</a:t>
+            </a:r>
+          </a:p>
+          <a:p>
             <a:r>
               <a:rPr lang="en-US" altLang="ko-KR" sz="1300" dirty="0">
                 <a:solidFill>
                   <a:schemeClr val="tx1"/>
                 </a:solidFill>
               </a:rPr>
-              <a:t> : </a:t>
-            </a:r>
-            <a:r>
-              <a:rPr lang="en-US" altLang="ko-KR" sz="1300" dirty="0" err="1">
-                <a:solidFill>
-                  <a:schemeClr val="tx1"/>
-                </a:solidFill>
-              </a:rPr>
-              <a:t>LocalDateTime</a:t>
-            </a:r>
-            <a:endParaRPr lang="en-US" altLang="ko-KR" sz="1300" dirty="0">
-              <a:solidFill>
-                <a:schemeClr val="tx1"/>
-              </a:solidFill>
-            </a:endParaRPr>
-          </a:p>
-          <a:p>
-            <a:r>
-              <a:rPr lang="en-US" altLang="ko-KR" sz="1300" dirty="0" err="1">
-                <a:solidFill>
-                  <a:schemeClr val="tx1"/>
-                </a:solidFill>
-              </a:rPr>
-              <a:t>endTime</a:t>
-            </a:r>
+              <a:t>start : Datetime</a:t>
+            </a:r>
+          </a:p>
+          <a:p>
             <a:r>
               <a:rPr lang="en-US" altLang="ko-KR" sz="1300" dirty="0">
                 <a:solidFill>
                   <a:schemeClr val="tx1"/>
                 </a:solidFill>
               </a:rPr>
-              <a:t> : </a:t>
-            </a:r>
-            <a:r>
-              <a:rPr lang="en-US" altLang="ko-KR" sz="1300" dirty="0" err="1">
-                <a:solidFill>
-                  <a:schemeClr val="tx1"/>
-                </a:solidFill>
-              </a:rPr>
-              <a:t>LocalDateTime</a:t>
-            </a:r>
-            <a:endParaRPr lang="en-US" altLang="ko-KR" sz="1300" dirty="0">
-              <a:solidFill>
-                <a:schemeClr val="tx1"/>
-              </a:solidFill>
-            </a:endParaRPr>
-          </a:p>
-          <a:p>
-            <a:r>
-              <a:rPr lang="en-US" altLang="ko-KR" sz="1300" dirty="0" err="1">
-                <a:solidFill>
-                  <a:schemeClr val="tx1"/>
-                </a:solidFill>
-              </a:rPr>
-              <a:t>timerStatus</a:t>
-            </a:r>
+              <a:t>end : Datetime</a:t>
+            </a:r>
+          </a:p>
+          <a:p>
             <a:r>
               <a:rPr lang="en-US" altLang="ko-KR" sz="1300" dirty="0">
                 <a:solidFill>
                   <a:schemeClr val="tx1"/>
                 </a:solidFill>
               </a:rPr>
-              <a:t> : </a:t>
-            </a:r>
-            <a:r>
-              <a:rPr lang="en-US" altLang="ko-KR" sz="1300" dirty="0" err="1">
-                <a:solidFill>
-                  <a:schemeClr val="tx1"/>
-                </a:solidFill>
-              </a:rPr>
-              <a:t>TimerStatus</a:t>
-            </a:r>
-            <a:endParaRPr lang="en-US" altLang="ko-KR" sz="1300" dirty="0">
-              <a:solidFill>
-                <a:schemeClr val="tx1"/>
-              </a:solidFill>
-            </a:endParaRPr>
+              <a:t>status : Boolean</a:t>
+            </a:r>
           </a:p>
         </p:txBody>
       </p:sp>
@@ -25801,7 +25686,7 @@
         </p:nvCxnSpPr>
         <p:spPr>
           <a:xfrm>
-            <a:off x="10264286" y="457838"/>
+            <a:off x="10264286" y="1018075"/>
             <a:ext cx="1819747" cy="0"/>
           </a:xfrm>
           <a:prstGeom prst="line">
@@ -25891,18 +25776,13 @@
           <a:lstStyle/>
           <a:p>
             <a:r>
-              <a:rPr lang="en-US" altLang="ko-KR" sz="1400" b="1" dirty="0" err="1">
+              <a:rPr lang="en-US" altLang="ko-KR" sz="1400" b="1" dirty="0">
                 <a:solidFill>
                   <a:schemeClr val="tx1"/>
                 </a:solidFill>
               </a:rPr>
-              <a:t>ListsTask</a:t>
-            </a:r>
-            <a:endParaRPr lang="en-US" altLang="ko-KR" sz="1400" b="1" dirty="0">
-              <a:solidFill>
-                <a:schemeClr val="tx1"/>
-              </a:solidFill>
-            </a:endParaRPr>
+              <a:t>LISTS_TASK</a:t>
+            </a:r>
           </a:p>
           <a:p>
             <a:endParaRPr lang="en-US" altLang="ko-KR" sz="1300" dirty="0">
@@ -25928,7 +25808,7 @@
                   <a:schemeClr val="tx1"/>
                 </a:solidFill>
               </a:rPr>
-              <a:t>lists : Lists</a:t>
+              <a:t>lists : LISTS</a:t>
             </a:r>
           </a:p>
           <a:p>
@@ -25938,7 +25818,7 @@
                   <a:schemeClr val="tx1"/>
                 </a:solidFill>
               </a:rPr>
-              <a:t>task : Task</a:t>
+              <a:t>task : TASK</a:t>
             </a:r>
           </a:p>
           <a:p>
@@ -25948,7 +25828,7 @@
                   <a:schemeClr val="tx1"/>
                 </a:solidFill>
               </a:rPr>
-              <a:t>count : Integer</a:t>
+              <a:t>count : Int</a:t>
             </a:r>
             <a:endParaRPr lang="ko-KR" altLang="en-US" sz="1300" dirty="0">
               <a:solidFill>
@@ -26054,8 +25934,8 @@
         </p:nvCxnSpPr>
         <p:spPr>
           <a:xfrm flipH="1">
-            <a:off x="11176890" y="2197495"/>
-            <a:ext cx="1170" cy="315899"/>
+            <a:off x="11176890" y="2197494"/>
+            <a:ext cx="1170" cy="315900"/>
           </a:xfrm>
           <a:prstGeom prst="line">
             <a:avLst/>
@@ -27312,6 +27192,82 @@
       </p:cxnSp>
       <p:cxnSp>
         <p:nvCxnSpPr>
+          <p:cNvPr id="183" name="직선 연결선 182">
+            <a:extLst>
+              <a:ext uri="{FF2B5EF4-FFF2-40B4-BE49-F238E27FC236}">
+                <a16:creationId xmlns:a16="http://schemas.microsoft.com/office/drawing/2014/main" id="{D19EE284-D378-F7C4-02C0-AFB4EA528D5D}"/>
+              </a:ext>
+            </a:extLst>
+          </p:cNvPr>
+          <p:cNvCxnSpPr>
+            <a:cxnSpLocks/>
+          </p:cNvCxnSpPr>
+          <p:nvPr/>
+        </p:nvCxnSpPr>
+        <p:spPr>
+          <a:xfrm>
+            <a:off x="6044647" y="4618753"/>
+            <a:ext cx="53355" cy="193379"/>
+          </a:xfrm>
+          <a:prstGeom prst="line">
+            <a:avLst/>
+          </a:prstGeom>
+        </p:spPr>
+        <p:style>
+          <a:lnRef idx="3">
+            <a:schemeClr val="dk1"/>
+          </a:lnRef>
+          <a:fillRef idx="0">
+            <a:schemeClr val="dk1"/>
+          </a:fillRef>
+          <a:effectRef idx="2">
+            <a:schemeClr val="dk1"/>
+          </a:effectRef>
+          <a:fontRef idx="minor">
+            <a:schemeClr val="tx1"/>
+          </a:fontRef>
+        </p:style>
+      </p:cxnSp>
+      <p:cxnSp>
+        <p:nvCxnSpPr>
+          <p:cNvPr id="184" name="직선 연결선 183">
+            <a:extLst>
+              <a:ext uri="{FF2B5EF4-FFF2-40B4-BE49-F238E27FC236}">
+                <a16:creationId xmlns:a16="http://schemas.microsoft.com/office/drawing/2014/main" id="{B608E9D5-227C-D350-C204-27EFB082A1E0}"/>
+              </a:ext>
+            </a:extLst>
+          </p:cNvPr>
+          <p:cNvCxnSpPr>
+            <a:cxnSpLocks/>
+          </p:cNvCxnSpPr>
+          <p:nvPr/>
+        </p:nvCxnSpPr>
+        <p:spPr>
+          <a:xfrm flipV="1">
+            <a:off x="5975627" y="4618753"/>
+            <a:ext cx="69020" cy="193379"/>
+          </a:xfrm>
+          <a:prstGeom prst="line">
+            <a:avLst/>
+          </a:prstGeom>
+        </p:spPr>
+        <p:style>
+          <a:lnRef idx="3">
+            <a:schemeClr val="dk1"/>
+          </a:lnRef>
+          <a:fillRef idx="0">
+            <a:schemeClr val="dk1"/>
+          </a:fillRef>
+          <a:effectRef idx="2">
+            <a:schemeClr val="dk1"/>
+          </a:effectRef>
+          <a:fontRef idx="minor">
+            <a:schemeClr val="tx1"/>
+          </a:fontRef>
+        </p:style>
+      </p:cxnSp>
+      <p:cxnSp>
+        <p:nvCxnSpPr>
           <p:cNvPr id="192" name="직선 연결선 191">
             <a:extLst>
               <a:ext uri="{FF2B5EF4-FFF2-40B4-BE49-F238E27FC236}">
@@ -27518,82 +27474,6 @@
           <a:xfrm flipV="1">
             <a:off x="10122527" y="3596580"/>
             <a:ext cx="148390" cy="43847"/>
-          </a:xfrm>
-          <a:prstGeom prst="line">
-            <a:avLst/>
-          </a:prstGeom>
-        </p:spPr>
-        <p:style>
-          <a:lnRef idx="3">
-            <a:schemeClr val="dk1"/>
-          </a:lnRef>
-          <a:fillRef idx="0">
-            <a:schemeClr val="dk1"/>
-          </a:fillRef>
-          <a:effectRef idx="2">
-            <a:schemeClr val="dk1"/>
-          </a:effectRef>
-          <a:fontRef idx="minor">
-            <a:schemeClr val="tx1"/>
-          </a:fontRef>
-        </p:style>
-      </p:cxnSp>
-      <p:cxnSp>
-        <p:nvCxnSpPr>
-          <p:cNvPr id="35" name="직선 연결선 34">
-            <a:extLst>
-              <a:ext uri="{FF2B5EF4-FFF2-40B4-BE49-F238E27FC236}">
-                <a16:creationId xmlns:a16="http://schemas.microsoft.com/office/drawing/2014/main" id="{6BCD6961-91FA-4927-C7D9-EC704F45599B}"/>
-              </a:ext>
-            </a:extLst>
-          </p:cNvPr>
-          <p:cNvCxnSpPr>
-            <a:cxnSpLocks/>
-          </p:cNvCxnSpPr>
-          <p:nvPr/>
-        </p:nvCxnSpPr>
-        <p:spPr>
-          <a:xfrm flipV="1">
-            <a:off x="6058437" y="5471246"/>
-            <a:ext cx="62870" cy="179135"/>
-          </a:xfrm>
-          <a:prstGeom prst="line">
-            <a:avLst/>
-          </a:prstGeom>
-        </p:spPr>
-        <p:style>
-          <a:lnRef idx="3">
-            <a:schemeClr val="dk1"/>
-          </a:lnRef>
-          <a:fillRef idx="0">
-            <a:schemeClr val="dk1"/>
-          </a:fillRef>
-          <a:effectRef idx="2">
-            <a:schemeClr val="dk1"/>
-          </a:effectRef>
-          <a:fontRef idx="minor">
-            <a:schemeClr val="tx1"/>
-          </a:fontRef>
-        </p:style>
-      </p:cxnSp>
-      <p:cxnSp>
-        <p:nvCxnSpPr>
-          <p:cNvPr id="36" name="직선 연결선 35">
-            <a:extLst>
-              <a:ext uri="{FF2B5EF4-FFF2-40B4-BE49-F238E27FC236}">
-                <a16:creationId xmlns:a16="http://schemas.microsoft.com/office/drawing/2014/main" id="{17825824-EEE5-5900-514C-B5E19A85A43E}"/>
-              </a:ext>
-            </a:extLst>
-          </p:cNvPr>
-          <p:cNvCxnSpPr>
-            <a:cxnSpLocks/>
-          </p:cNvCxnSpPr>
-          <p:nvPr/>
-        </p:nvCxnSpPr>
-        <p:spPr>
-          <a:xfrm>
-            <a:off x="5997206" y="5471246"/>
-            <a:ext cx="62870" cy="179135"/>
           </a:xfrm>
           <a:prstGeom prst="line">
             <a:avLst/>
@@ -27737,7 +27617,7 @@
           <p:cNvPr id="6" name="그림 5">
             <a:extLst>
               <a:ext uri="{FF2B5EF4-FFF2-40B4-BE49-F238E27FC236}">
-                <a16:creationId xmlns:a16="http://schemas.microsoft.com/office/drawing/2014/main" id="{73B85BC9-3F7D-8163-19BA-6A5B532A33F2}"/>
+                <a16:creationId xmlns:a16="http://schemas.microsoft.com/office/drawing/2014/main" id="{BB522715-3F01-BDEF-D00A-ED35CE1A7BA0}"/>
               </a:ext>
             </a:extLst>
           </p:cNvPr>
@@ -27754,8 +27634,8 @@
         </p:blipFill>
         <p:spPr>
           <a:xfrm>
-            <a:off x="0" y="1228726"/>
-            <a:ext cx="12192000" cy="4814888"/>
+            <a:off x="279919" y="1215299"/>
+            <a:ext cx="11682472" cy="5082980"/>
           </a:xfrm>
           <a:prstGeom prst="rect">
             <a:avLst/>

</xml_diff>